<commit_message>
Updated inter-domain example figures
</commit_message>
<xml_diff>
--- a/papers/oopsla17/figures/bgp-example.pptx
+++ b/papers/oopsla17/figures/bgp-example.pptx
@@ -243,7 +243,7 @@
           <a:p>
             <a:fld id="{295E39A9-0D84-BB41-AF08-AE65968AB772}" type="datetimeFigureOut">
               <a:rPr lang="en-US" smtClean="0"/>
-              <a:t>11/16/16</a:t>
+              <a:t>4/18/17</a:t>
             </a:fld>
             <a:endParaRPr lang="en-US"/>
           </a:p>
@@ -413,7 +413,7 @@
           <a:p>
             <a:fld id="{295E39A9-0D84-BB41-AF08-AE65968AB772}" type="datetimeFigureOut">
               <a:rPr lang="en-US" smtClean="0"/>
-              <a:t>11/16/16</a:t>
+              <a:t>4/18/17</a:t>
             </a:fld>
             <a:endParaRPr lang="en-US"/>
           </a:p>
@@ -593,7 +593,7 @@
           <a:p>
             <a:fld id="{295E39A9-0D84-BB41-AF08-AE65968AB772}" type="datetimeFigureOut">
               <a:rPr lang="en-US" smtClean="0"/>
-              <a:t>11/16/16</a:t>
+              <a:t>4/18/17</a:t>
             </a:fld>
             <a:endParaRPr lang="en-US"/>
           </a:p>
@@ -763,7 +763,7 @@
           <a:p>
             <a:fld id="{295E39A9-0D84-BB41-AF08-AE65968AB772}" type="datetimeFigureOut">
               <a:rPr lang="en-US" smtClean="0"/>
-              <a:t>11/16/16</a:t>
+              <a:t>4/18/17</a:t>
             </a:fld>
             <a:endParaRPr lang="en-US"/>
           </a:p>
@@ -1009,7 +1009,7 @@
           <a:p>
             <a:fld id="{295E39A9-0D84-BB41-AF08-AE65968AB772}" type="datetimeFigureOut">
               <a:rPr lang="en-US" smtClean="0"/>
-              <a:t>11/16/16</a:t>
+              <a:t>4/18/17</a:t>
             </a:fld>
             <a:endParaRPr lang="en-US"/>
           </a:p>
@@ -1241,7 +1241,7 @@
           <a:p>
             <a:fld id="{295E39A9-0D84-BB41-AF08-AE65968AB772}" type="datetimeFigureOut">
               <a:rPr lang="en-US" smtClean="0"/>
-              <a:t>11/16/16</a:t>
+              <a:t>4/18/17</a:t>
             </a:fld>
             <a:endParaRPr lang="en-US"/>
           </a:p>
@@ -1608,7 +1608,7 @@
           <a:p>
             <a:fld id="{295E39A9-0D84-BB41-AF08-AE65968AB772}" type="datetimeFigureOut">
               <a:rPr lang="en-US" smtClean="0"/>
-              <a:t>11/16/16</a:t>
+              <a:t>4/18/17</a:t>
             </a:fld>
             <a:endParaRPr lang="en-US"/>
           </a:p>
@@ -1726,7 +1726,7 @@
           <a:p>
             <a:fld id="{295E39A9-0D84-BB41-AF08-AE65968AB772}" type="datetimeFigureOut">
               <a:rPr lang="en-US" smtClean="0"/>
-              <a:t>11/16/16</a:t>
+              <a:t>4/18/17</a:t>
             </a:fld>
             <a:endParaRPr lang="en-US"/>
           </a:p>
@@ -1821,7 +1821,7 @@
           <a:p>
             <a:fld id="{295E39A9-0D84-BB41-AF08-AE65968AB772}" type="datetimeFigureOut">
               <a:rPr lang="en-US" smtClean="0"/>
-              <a:t>11/16/16</a:t>
+              <a:t>4/18/17</a:t>
             </a:fld>
             <a:endParaRPr lang="en-US"/>
           </a:p>
@@ -2098,7 +2098,7 @@
           <a:p>
             <a:fld id="{295E39A9-0D84-BB41-AF08-AE65968AB772}" type="datetimeFigureOut">
               <a:rPr lang="en-US" smtClean="0"/>
-              <a:t>11/16/16</a:t>
+              <a:t>4/18/17</a:t>
             </a:fld>
             <a:endParaRPr lang="en-US"/>
           </a:p>
@@ -2351,7 +2351,7 @@
           <a:p>
             <a:fld id="{295E39A9-0D84-BB41-AF08-AE65968AB772}" type="datetimeFigureOut">
               <a:rPr lang="en-US" smtClean="0"/>
-              <a:t>11/16/16</a:t>
+              <a:t>4/18/17</a:t>
             </a:fld>
             <a:endParaRPr lang="en-US"/>
           </a:p>
@@ -2564,7 +2564,7 @@
           <a:p>
             <a:fld id="{295E39A9-0D84-BB41-AF08-AE65968AB772}" type="datetimeFigureOut">
               <a:rPr lang="en-US" smtClean="0"/>
-              <a:t>11/16/16</a:t>
+              <a:t>4/18/17</a:t>
             </a:fld>
             <a:endParaRPr lang="en-US"/>
           </a:p>
@@ -4848,11 +4848,11 @@
           <a:lstStyle/>
           <a:p>
             <a:r>
-              <a:rPr lang="en-US" sz="3200" dirty="0"/>
+              <a:rPr lang="en-US" sz="3200" dirty="0" smtClean="0"/>
               <a:t>D</a:t>
             </a:r>
             <a:r>
-              <a:rPr lang="en-US" sz="3200" dirty="0" smtClean="0"/>
+              <a:rPr lang="en-US" sz="3200" baseline="-25000" dirty="0"/>
               <a:t>0</a:t>
             </a:r>
             <a:endParaRPr lang="en-US" sz="3200" dirty="0"/>
@@ -4886,10 +4886,10 @@
               <a:t>D</a:t>
             </a:r>
             <a:r>
-              <a:rPr lang="en-US" sz="3200" dirty="0" smtClean="0"/>
+              <a:rPr lang="en-US" sz="3200" baseline="-25000" dirty="0" smtClean="0"/>
               <a:t>2</a:t>
             </a:r>
-            <a:endParaRPr lang="en-US" sz="3200" dirty="0"/>
+            <a:endParaRPr lang="en-US" sz="3200" baseline="-25000" dirty="0"/>
           </a:p>
         </p:txBody>
       </p:sp>
@@ -4920,10 +4920,10 @@
               <a:t>D</a:t>
             </a:r>
             <a:r>
-              <a:rPr lang="en-US" sz="3200" dirty="0" smtClean="0"/>
+              <a:rPr lang="en-US" sz="3200" baseline="-25000" dirty="0" smtClean="0"/>
               <a:t>1</a:t>
             </a:r>
-            <a:endParaRPr lang="en-US" sz="3200" dirty="0"/>
+            <a:endParaRPr lang="en-US" sz="3200" baseline="-25000" dirty="0"/>
           </a:p>
         </p:txBody>
       </p:sp>
@@ -5620,7 +5620,11 @@
           <a:p>
             <a:r>
               <a:rPr lang="en-US" sz="3200" i="1" dirty="0" smtClean="0"/>
-              <a:t>= 100</a:t>
+              <a:t>= </a:t>
+            </a:r>
+            <a:r>
+              <a:rPr lang="en-US" sz="3200" i="1" dirty="0" smtClean="0"/>
+              <a:t>200</a:t>
             </a:r>
             <a:endParaRPr lang="en-US" sz="3200" i="1" dirty="0"/>
           </a:p>

</xml_diff>